<commit_message>
modificata slide ex 1
</commit_message>
<xml_diff>
--- a/EXERCISE 1 - STATE MACHINE/EXERCISE 1 – STATE MACHINE ENGINE (1).pptx
+++ b/EXERCISE 1 - STATE MACHINE/EXERCISE 1 – STATE MACHINE ENGINE (1).pptx
@@ -1788,7 +1788,7 @@
           <a:p>
             <a:fld id="{8F72BA41-EC5B-4197-BCC8-0FD2E523CD7A}" type="datetimeFigureOut">
               <a:rPr lang="en-US" smtClean="0"/>
-              <a:t>11/18/2024</a:t>
+              <a:t>1/20/2025</a:t>
             </a:fld>
             <a:endParaRPr lang="en-US"/>
           </a:p>
@@ -1991,7 +1991,7 @@
           <a:p>
             <a:fld id="{8F72BA41-EC5B-4197-BCC8-0FD2E523CD7A}" type="datetimeFigureOut">
               <a:rPr lang="en-US" smtClean="0"/>
-              <a:t>11/18/2024</a:t>
+              <a:t>1/20/2025</a:t>
             </a:fld>
             <a:endParaRPr lang="en-US"/>
           </a:p>
@@ -3712,7 +3712,7 @@
           <a:p>
             <a:fld id="{8F72BA41-EC5B-4197-BCC8-0FD2E523CD7A}" type="datetimeFigureOut">
               <a:rPr lang="en-US" smtClean="0"/>
-              <a:t>11/18/2024</a:t>
+              <a:t>1/20/2025</a:t>
             </a:fld>
             <a:endParaRPr lang="en-US"/>
           </a:p>
@@ -3911,7 +3911,7 @@
           <a:p>
             <a:fld id="{8F72BA41-EC5B-4197-BCC8-0FD2E523CD7A}" type="datetimeFigureOut">
               <a:rPr lang="en-US" smtClean="0"/>
-              <a:t>11/18/2024</a:t>
+              <a:t>1/20/2025</a:t>
             </a:fld>
             <a:endParaRPr lang="en-US"/>
           </a:p>
@@ -5701,7 +5701,7 @@
           <a:p>
             <a:fld id="{8F72BA41-EC5B-4197-BCC8-0FD2E523CD7A}" type="datetimeFigureOut">
               <a:rPr lang="en-US" smtClean="0"/>
-              <a:t>11/18/2024</a:t>
+              <a:t>1/20/2025</a:t>
             </a:fld>
             <a:endParaRPr lang="en-US"/>
           </a:p>
@@ -5974,7 +5974,7 @@
           <a:p>
             <a:fld id="{8F72BA41-EC5B-4197-BCC8-0FD2E523CD7A}" type="datetimeFigureOut">
               <a:rPr lang="en-US" smtClean="0"/>
-              <a:t>11/18/2024</a:t>
+              <a:t>1/20/2025</a:t>
             </a:fld>
             <a:endParaRPr lang="en-US"/>
           </a:p>
@@ -6394,7 +6394,7 @@
           <a:p>
             <a:fld id="{8F72BA41-EC5B-4197-BCC8-0FD2E523CD7A}" type="datetimeFigureOut">
               <a:rPr lang="en-US" smtClean="0"/>
-              <a:t>11/18/2024</a:t>
+              <a:t>1/20/2025</a:t>
             </a:fld>
             <a:endParaRPr lang="en-US"/>
           </a:p>
@@ -6550,7 +6550,7 @@
           <a:p>
             <a:fld id="{8F72BA41-EC5B-4197-BCC8-0FD2E523CD7A}" type="datetimeFigureOut">
               <a:rPr lang="en-US" smtClean="0"/>
-              <a:t>11/18/2024</a:t>
+              <a:t>1/20/2025</a:t>
             </a:fld>
             <a:endParaRPr lang="en-US"/>
           </a:p>
@@ -8118,7 +8118,7 @@
           <a:p>
             <a:fld id="{8F72BA41-EC5B-4197-BCC8-0FD2E523CD7A}" type="datetimeFigureOut">
               <a:rPr lang="en-US" smtClean="0"/>
-              <a:t>11/18/2024</a:t>
+              <a:t>1/20/2025</a:t>
             </a:fld>
             <a:endParaRPr lang="en-US"/>
           </a:p>
@@ -9969,7 +9969,7 @@
           <a:p>
             <a:fld id="{8F72BA41-EC5B-4197-BCC8-0FD2E523CD7A}" type="datetimeFigureOut">
               <a:rPr lang="en-US" smtClean="0"/>
-              <a:t>11/18/2024</a:t>
+              <a:t>1/20/2025</a:t>
             </a:fld>
             <a:endParaRPr lang="en-US"/>
           </a:p>
@@ -11782,7 +11782,7 @@
           <a:p>
             <a:fld id="{8F72BA41-EC5B-4197-BCC8-0FD2E523CD7A}" type="datetimeFigureOut">
               <a:rPr lang="en-US" smtClean="0"/>
-              <a:t>11/18/2024</a:t>
+              <a:t>1/20/2025</a:t>
             </a:fld>
             <a:endParaRPr lang="en-US"/>
           </a:p>
@@ -13476,7 +13476,7 @@
             <a:fld id="{8F72BA41-EC5B-4197-BCC8-0FD2E523CD7A}" type="datetimeFigureOut">
               <a:rPr lang="en-US" smtClean="0"/>
               <a:pPr/>
-              <a:t>11/18/2024</a:t>
+              <a:t>1/20/2025</a:t>
             </a:fld>
             <a:endParaRPr lang="en-US" dirty="0"/>
           </a:p>
@@ -19899,14 +19899,14 @@
               </a:lnSpc>
             </a:pPr>
             <a:r>
-              <a:rPr lang="en-US" sz="4600" dirty="0"/>
+              <a:rPr lang="en-US" sz="4600" b="1" dirty="0"/>
               <a:t>EXAMPLE WITH A </a:t>
             </a:r>
             <a:br>
-              <a:rPr lang="en-US" sz="4600" dirty="0"/>
+              <a:rPr lang="en-US" sz="4600" b="1" dirty="0"/>
             </a:br>
             <a:r>
-              <a:rPr lang="en-US" sz="4600" dirty="0"/>
+              <a:rPr lang="en-US" sz="4600" b="1" dirty="0"/>
               <a:t>GIVEN INPUT</a:t>
             </a:r>
           </a:p>
@@ -25989,203 +25989,8 @@
           <a:p>
             <a:r>
               <a:rPr lang="it-IT" b="1" dirty="0"/>
-              <a:t>JSON SPECIFICATIONS - ODD NUMERS </a:t>
+              <a:t>JSON SPECIFICATIONS - ODD NUMBERS </a:t>
             </a:r>
-          </a:p>
-        </p:txBody>
-      </p:sp>
-      <p:sp>
-        <p:nvSpPr>
-          <p:cNvPr id="51" name="Content Placeholder 50">
-            <a:extLst>
-              <a:ext uri="{FF2B5EF4-FFF2-40B4-BE49-F238E27FC236}">
-                <a16:creationId xmlns:a16="http://schemas.microsoft.com/office/drawing/2014/main" id="{3FB5F7DA-1A8E-E2C3-6374-01009E39C56B}"/>
-              </a:ext>
-            </a:extLst>
-          </p:cNvPr>
-          <p:cNvSpPr>
-            <a:spLocks noGrp="1"/>
-          </p:cNvSpPr>
-          <p:nvPr>
-            <p:ph idx="1"/>
-          </p:nvPr>
-        </p:nvSpPr>
-        <p:spPr>
-          <a:xfrm>
-            <a:off x="6092891" y="2340130"/>
-            <a:ext cx="4916971" cy="4343046"/>
-          </a:xfrm>
-        </p:spPr>
-        <p:txBody>
-          <a:bodyPr>
-            <a:normAutofit/>
-          </a:bodyPr>
-          <a:lstStyle/>
-          <a:p>
-            <a:r>
-              <a:rPr lang="en-US" dirty="0"/>
-              <a:t>JSON is used to clearly describe the components and behaviors of a finite state machine (FSM) in a structured format. </a:t>
-            </a:r>
-          </a:p>
-          <a:p>
-            <a:r>
-              <a:rPr lang="it-IT" altLang="it-IT" dirty="0" err="1"/>
-              <a:t>Starting</a:t>
-            </a:r>
-            <a:r>
-              <a:rPr lang="it-IT" altLang="it-IT" dirty="0"/>
-              <a:t> from "START", </a:t>
-            </a:r>
-            <a:r>
-              <a:rPr lang="it-IT" altLang="it-IT" dirty="0" err="1"/>
-              <a:t>this</a:t>
-            </a:r>
-            <a:r>
-              <a:rPr lang="it-IT" altLang="it-IT" dirty="0"/>
-              <a:t> FSM </a:t>
-            </a:r>
-            <a:r>
-              <a:rPr lang="it-IT" altLang="it-IT" dirty="0" err="1"/>
-              <a:t>reads</a:t>
-            </a:r>
-            <a:r>
-              <a:rPr lang="it-IT" altLang="it-IT" dirty="0"/>
-              <a:t> a </a:t>
-            </a:r>
-            <a:r>
-              <a:rPr lang="it-IT" altLang="it-IT" dirty="0" err="1"/>
-              <a:t>binary</a:t>
-            </a:r>
-            <a:r>
-              <a:rPr lang="it-IT" altLang="it-IT" dirty="0"/>
-              <a:t> </a:t>
-            </a:r>
-            <a:r>
-              <a:rPr lang="it-IT" altLang="it-IT" dirty="0" err="1"/>
-              <a:t>string</a:t>
-            </a:r>
-            <a:r>
-              <a:rPr lang="it-IT" altLang="it-IT" dirty="0"/>
-              <a:t> and tracks </a:t>
-            </a:r>
-            <a:r>
-              <a:rPr lang="it-IT" altLang="it-IT" dirty="0" err="1"/>
-              <a:t>whether</a:t>
-            </a:r>
-            <a:r>
-              <a:rPr lang="it-IT" altLang="it-IT" dirty="0"/>
-              <a:t> the </a:t>
-            </a:r>
-            <a:r>
-              <a:rPr lang="it-IT" altLang="it-IT" dirty="0" err="1"/>
-              <a:t>number</a:t>
-            </a:r>
-            <a:r>
-              <a:rPr lang="it-IT" altLang="it-IT" dirty="0"/>
-              <a:t> of '1's </a:t>
-            </a:r>
-            <a:r>
-              <a:rPr lang="it-IT" altLang="it-IT" dirty="0" err="1"/>
-              <a:t>is</a:t>
-            </a:r>
-            <a:r>
-              <a:rPr lang="it-IT" altLang="it-IT" dirty="0"/>
-              <a:t> </a:t>
-            </a:r>
-            <a:r>
-              <a:rPr lang="it-IT" altLang="it-IT" dirty="0" err="1"/>
-              <a:t>even</a:t>
-            </a:r>
-            <a:r>
-              <a:rPr lang="it-IT" altLang="it-IT" dirty="0"/>
-              <a:t> or </a:t>
-            </a:r>
-            <a:r>
-              <a:rPr lang="it-IT" altLang="it-IT" dirty="0" err="1"/>
-              <a:t>odd</a:t>
-            </a:r>
-            <a:r>
-              <a:rPr lang="it-IT" altLang="it-IT" dirty="0"/>
-              <a:t>. </a:t>
-            </a:r>
-            <a:r>
-              <a:rPr lang="it-IT" altLang="it-IT" dirty="0" err="1"/>
-              <a:t>It</a:t>
-            </a:r>
-            <a:r>
-              <a:rPr lang="it-IT" altLang="it-IT" dirty="0"/>
-              <a:t> </a:t>
-            </a:r>
-            <a:r>
-              <a:rPr lang="it-IT" altLang="it-IT" dirty="0" err="1"/>
-              <a:t>accepts</a:t>
-            </a:r>
-            <a:r>
-              <a:rPr lang="it-IT" altLang="it-IT" dirty="0"/>
-              <a:t> the </a:t>
-            </a:r>
-            <a:r>
-              <a:rPr lang="it-IT" altLang="it-IT" dirty="0" err="1"/>
-              <a:t>string</a:t>
-            </a:r>
-            <a:r>
-              <a:rPr lang="it-IT" altLang="it-IT" dirty="0"/>
-              <a:t> </a:t>
-            </a:r>
-            <a:r>
-              <a:rPr lang="it-IT" altLang="it-IT" dirty="0" err="1"/>
-              <a:t>if</a:t>
-            </a:r>
-            <a:r>
-              <a:rPr lang="it-IT" altLang="it-IT" dirty="0"/>
-              <a:t> the </a:t>
-            </a:r>
-            <a:r>
-              <a:rPr lang="it-IT" altLang="it-IT" dirty="0" err="1"/>
-              <a:t>final</a:t>
-            </a:r>
-            <a:r>
-              <a:rPr lang="it-IT" altLang="it-IT" dirty="0"/>
-              <a:t> </a:t>
-            </a:r>
-            <a:r>
-              <a:rPr lang="it-IT" altLang="it-IT" dirty="0" err="1"/>
-              <a:t>count</a:t>
-            </a:r>
-            <a:r>
-              <a:rPr lang="it-IT" altLang="it-IT" dirty="0"/>
-              <a:t> of '1's </a:t>
-            </a:r>
-            <a:r>
-              <a:rPr lang="it-IT" altLang="it-IT" dirty="0" err="1"/>
-              <a:t>is</a:t>
-            </a:r>
-            <a:r>
-              <a:rPr lang="it-IT" altLang="it-IT" dirty="0"/>
-              <a:t> </a:t>
-            </a:r>
-            <a:r>
-              <a:rPr lang="it-IT" altLang="it-IT" dirty="0" err="1"/>
-              <a:t>even</a:t>
-            </a:r>
-            <a:r>
-              <a:rPr lang="it-IT" altLang="it-IT" dirty="0"/>
-              <a:t>, </a:t>
-            </a:r>
-            <a:r>
-              <a:rPr lang="it-IT" altLang="it-IT" dirty="0" err="1"/>
-              <a:t>ending</a:t>
-            </a:r>
-            <a:r>
-              <a:rPr lang="it-IT" altLang="it-IT" dirty="0"/>
-              <a:t> in the "EVEN" state. </a:t>
-            </a:r>
-          </a:p>
-          <a:p>
-            <a:endParaRPr lang="en-US" dirty="0"/>
-          </a:p>
-          <a:p>
-            <a:endParaRPr lang="en-US" dirty="0"/>
           </a:p>
         </p:txBody>
       </p:sp>
@@ -26225,6 +26030,391 @@
           </a:prstGeom>
         </p:spPr>
       </p:pic>
+      <p:sp>
+        <p:nvSpPr>
+          <p:cNvPr id="4" name="Rectangle 1">
+            <a:extLst>
+              <a:ext uri="{FF2B5EF4-FFF2-40B4-BE49-F238E27FC236}">
+                <a16:creationId xmlns:a16="http://schemas.microsoft.com/office/drawing/2014/main" id="{471D3BD9-7A7D-A4C8-9F62-BE18E4FE36A7}"/>
+              </a:ext>
+            </a:extLst>
+          </p:cNvPr>
+          <p:cNvSpPr txBox="1">
+            <a:spLocks noChangeArrowheads="1"/>
+          </p:cNvSpPr>
+          <p:nvPr/>
+        </p:nvSpPr>
+        <p:spPr bwMode="auto">
+          <a:xfrm>
+            <a:off x="6092891" y="2340130"/>
+            <a:ext cx="4916971" cy="3803271"/>
+          </a:xfrm>
+          <a:prstGeom prst="rect">
+            <a:avLst/>
+          </a:prstGeom>
+          <a:extLst>
+            <a:ext uri="{909E8E84-426E-40DD-AFC4-6F175D3DCCD1}">
+              <a14:hiddenFill xmlns:a14="http://schemas.microsoft.com/office/drawing/2010/main">
+                <a:solidFill>
+                  <a:schemeClr val="accent1"/>
+                </a:solidFill>
+              </a14:hiddenFill>
+            </a:ext>
+            <a:ext uri="{91240B29-F687-4F45-9708-019B960494DF}">
+              <a14:hiddenLine xmlns:a14="http://schemas.microsoft.com/office/drawing/2010/main" w="9525">
+                <a:solidFill>
+                  <a:schemeClr val="tx1"/>
+                </a:solidFill>
+                <a:miter lim="800000"/>
+                <a:headEnd/>
+                <a:tailEnd/>
+              </a14:hiddenLine>
+            </a:ext>
+            <a:ext uri="{AF507438-7753-43E0-B8FC-AC1667EBCBE1}">
+              <a14:hiddenEffects xmlns:a14="http://schemas.microsoft.com/office/drawing/2010/main">
+                <a:effectLst>
+                  <a:outerShdw dist="35921" dir="2700000" algn="ctr" rotWithShape="0">
+                    <a:schemeClr val="bg2"/>
+                  </a:outerShdw>
+                </a:effectLst>
+              </a14:hiddenEffects>
+            </a:ext>
+          </a:extLst>
+        </p:spPr>
+        <p:txBody>
+          <a:bodyPr vert="horz" lIns="91440" tIns="45720" rIns="91440" bIns="45720" numCol="1" rtlCol="0" anchorCtr="0" compatLnSpc="1">
+            <a:prstTxWarp prst="textNoShape">
+              <a:avLst/>
+            </a:prstTxWarp>
+            <a:normAutofit/>
+          </a:bodyPr>
+          <a:lstStyle>
+            <a:lvl1pPr marL="228600" indent="-228600" algn="l" defTabSz="914400" rtl="0" eaLnBrk="1" latinLnBrk="0" hangingPunct="1">
+              <a:lnSpc>
+                <a:spcPct val="110000"/>
+              </a:lnSpc>
+              <a:spcBef>
+                <a:spcPts val="1000"/>
+              </a:spcBef>
+              <a:buClr>
+                <a:schemeClr val="tx2">
+                  <a:lumMod val="50000"/>
+                  <a:lumOff val="50000"/>
+                </a:schemeClr>
+              </a:buClr>
+              <a:buSzPct val="75000"/>
+              <a:buFont typeface="Wingdings" panose="05000000000000000000" pitchFamily="2" charset="2"/>
+              <a:buChar char="§"/>
+              <a:defRPr sz="2000" kern="1200">
+                <a:solidFill>
+                  <a:schemeClr val="tx2"/>
+                </a:solidFill>
+                <a:latin typeface="+mn-lt"/>
+                <a:ea typeface="+mn-ea"/>
+                <a:cs typeface="+mn-cs"/>
+              </a:defRPr>
+            </a:lvl1pPr>
+            <a:lvl2pPr marL="457200" indent="-228600" algn="l" defTabSz="914400" rtl="0" eaLnBrk="1" latinLnBrk="0" hangingPunct="1">
+              <a:lnSpc>
+                <a:spcPct val="110000"/>
+              </a:lnSpc>
+              <a:spcBef>
+                <a:spcPts val="500"/>
+              </a:spcBef>
+              <a:buClr>
+                <a:schemeClr val="tx2">
+                  <a:lumMod val="50000"/>
+                  <a:lumOff val="50000"/>
+                </a:schemeClr>
+              </a:buClr>
+              <a:buSzPct val="75000"/>
+              <a:buFont typeface="Wingdings" panose="05000000000000000000" pitchFamily="2" charset="2"/>
+              <a:buChar char="§"/>
+              <a:defRPr sz="1800" kern="1200">
+                <a:solidFill>
+                  <a:schemeClr val="tx2"/>
+                </a:solidFill>
+                <a:latin typeface="+mn-lt"/>
+                <a:ea typeface="+mn-ea"/>
+                <a:cs typeface="+mn-cs"/>
+              </a:defRPr>
+            </a:lvl2pPr>
+            <a:lvl3pPr marL="685800" indent="-228600" algn="l" defTabSz="914400" rtl="0" eaLnBrk="1" latinLnBrk="0" hangingPunct="1">
+              <a:lnSpc>
+                <a:spcPct val="110000"/>
+              </a:lnSpc>
+              <a:spcBef>
+                <a:spcPts val="500"/>
+              </a:spcBef>
+              <a:buClr>
+                <a:schemeClr val="tx2">
+                  <a:lumMod val="50000"/>
+                  <a:lumOff val="50000"/>
+                </a:schemeClr>
+              </a:buClr>
+              <a:buSzPct val="75000"/>
+              <a:buFont typeface="Wingdings" panose="05000000000000000000" pitchFamily="2" charset="2"/>
+              <a:buChar char="§"/>
+              <a:defRPr sz="1600" kern="1200">
+                <a:solidFill>
+                  <a:schemeClr val="tx2"/>
+                </a:solidFill>
+                <a:latin typeface="+mn-lt"/>
+                <a:ea typeface="+mn-ea"/>
+                <a:cs typeface="+mn-cs"/>
+              </a:defRPr>
+            </a:lvl3pPr>
+            <a:lvl4pPr marL="914400" indent="-228600" algn="l" defTabSz="914400" rtl="0" eaLnBrk="1" latinLnBrk="0" hangingPunct="1">
+              <a:lnSpc>
+                <a:spcPct val="110000"/>
+              </a:lnSpc>
+              <a:spcBef>
+                <a:spcPts val="500"/>
+              </a:spcBef>
+              <a:buClr>
+                <a:schemeClr val="tx2">
+                  <a:lumMod val="50000"/>
+                  <a:lumOff val="50000"/>
+                </a:schemeClr>
+              </a:buClr>
+              <a:buSzPct val="75000"/>
+              <a:buFont typeface="Wingdings" panose="05000000000000000000" pitchFamily="2" charset="2"/>
+              <a:buChar char="§"/>
+              <a:defRPr sz="1400" kern="1200">
+                <a:solidFill>
+                  <a:schemeClr val="tx2"/>
+                </a:solidFill>
+                <a:latin typeface="+mn-lt"/>
+                <a:ea typeface="+mn-ea"/>
+                <a:cs typeface="+mn-cs"/>
+              </a:defRPr>
+            </a:lvl4pPr>
+            <a:lvl5pPr marL="1143000" indent="-228600" algn="l" defTabSz="914400" rtl="0" eaLnBrk="1" latinLnBrk="0" hangingPunct="1">
+              <a:lnSpc>
+                <a:spcPct val="110000"/>
+              </a:lnSpc>
+              <a:spcBef>
+                <a:spcPts val="500"/>
+              </a:spcBef>
+              <a:buClr>
+                <a:schemeClr val="tx2">
+                  <a:lumMod val="50000"/>
+                  <a:lumOff val="50000"/>
+                </a:schemeClr>
+              </a:buClr>
+              <a:buSzPct val="75000"/>
+              <a:buFont typeface="Wingdings" panose="05000000000000000000" pitchFamily="2" charset="2"/>
+              <a:buChar char="§"/>
+              <a:defRPr sz="1400" kern="1200">
+                <a:solidFill>
+                  <a:schemeClr val="tx2"/>
+                </a:solidFill>
+                <a:latin typeface="+mn-lt"/>
+                <a:ea typeface="+mn-ea"/>
+                <a:cs typeface="+mn-cs"/>
+              </a:defRPr>
+            </a:lvl5pPr>
+            <a:lvl6pPr marL="2514600" indent="-228600" algn="l" defTabSz="914400" rtl="0" eaLnBrk="1" latinLnBrk="0" hangingPunct="1">
+              <a:lnSpc>
+                <a:spcPct val="90000"/>
+              </a:lnSpc>
+              <a:spcBef>
+                <a:spcPts val="500"/>
+              </a:spcBef>
+              <a:buFont typeface="Arial" panose="020B0604020202020204" pitchFamily="34" charset="0"/>
+              <a:buChar char="•"/>
+              <a:defRPr sz="1800" kern="1200">
+                <a:solidFill>
+                  <a:schemeClr val="tx1"/>
+                </a:solidFill>
+                <a:latin typeface="+mn-lt"/>
+                <a:ea typeface="+mn-ea"/>
+                <a:cs typeface="+mn-cs"/>
+              </a:defRPr>
+            </a:lvl6pPr>
+            <a:lvl7pPr marL="2971800" indent="-228600" algn="l" defTabSz="914400" rtl="0" eaLnBrk="1" latinLnBrk="0" hangingPunct="1">
+              <a:lnSpc>
+                <a:spcPct val="90000"/>
+              </a:lnSpc>
+              <a:spcBef>
+                <a:spcPts val="500"/>
+              </a:spcBef>
+              <a:buFont typeface="Arial" panose="020B0604020202020204" pitchFamily="34" charset="0"/>
+              <a:buChar char="•"/>
+              <a:defRPr sz="1800" kern="1200">
+                <a:solidFill>
+                  <a:schemeClr val="tx1"/>
+                </a:solidFill>
+                <a:latin typeface="+mn-lt"/>
+                <a:ea typeface="+mn-ea"/>
+                <a:cs typeface="+mn-cs"/>
+              </a:defRPr>
+            </a:lvl7pPr>
+            <a:lvl8pPr marL="3429000" indent="-228600" algn="l" defTabSz="914400" rtl="0" eaLnBrk="1" latinLnBrk="0" hangingPunct="1">
+              <a:lnSpc>
+                <a:spcPct val="90000"/>
+              </a:lnSpc>
+              <a:spcBef>
+                <a:spcPts val="500"/>
+              </a:spcBef>
+              <a:buFont typeface="Arial" panose="020B0604020202020204" pitchFamily="34" charset="0"/>
+              <a:buChar char="•"/>
+              <a:defRPr sz="1800" kern="1200">
+                <a:solidFill>
+                  <a:schemeClr val="tx1"/>
+                </a:solidFill>
+                <a:latin typeface="+mn-lt"/>
+                <a:ea typeface="+mn-ea"/>
+                <a:cs typeface="+mn-cs"/>
+              </a:defRPr>
+            </a:lvl8pPr>
+            <a:lvl9pPr marL="3886200" indent="-228600" algn="l" defTabSz="914400" rtl="0" eaLnBrk="1" latinLnBrk="0" hangingPunct="1">
+              <a:lnSpc>
+                <a:spcPct val="90000"/>
+              </a:lnSpc>
+              <a:spcBef>
+                <a:spcPts val="500"/>
+              </a:spcBef>
+              <a:buFont typeface="Arial" panose="020B0604020202020204" pitchFamily="34" charset="0"/>
+              <a:buChar char="•"/>
+              <a:defRPr sz="1800" kern="1200">
+                <a:solidFill>
+                  <a:schemeClr val="tx1"/>
+                </a:solidFill>
+                <a:latin typeface="+mn-lt"/>
+                <a:ea typeface="+mn-ea"/>
+                <a:cs typeface="+mn-cs"/>
+              </a:defRPr>
+            </a:lvl9pPr>
+          </a:lstStyle>
+          <a:p>
+            <a:pPr marL="0" indent="0" eaLnBrk="0" fontAlgn="base" hangingPunct="0">
+              <a:spcBef>
+                <a:spcPct val="0"/>
+              </a:spcBef>
+              <a:spcAft>
+                <a:spcPts val="600"/>
+              </a:spcAft>
+              <a:buClrTx/>
+              <a:buSzTx/>
+              <a:buFontTx/>
+              <a:buNone/>
+            </a:pPr>
+            <a:r>
+              <a:rPr lang="it-IT" altLang="it-IT" dirty="0" err="1"/>
+              <a:t>Starting</a:t>
+            </a:r>
+            <a:r>
+              <a:rPr lang="it-IT" altLang="it-IT" dirty="0"/>
+              <a:t> from "START", this FSM </a:t>
+            </a:r>
+            <a:r>
+              <a:rPr lang="it-IT" altLang="it-IT" dirty="0" err="1"/>
+              <a:t>reads</a:t>
+            </a:r>
+            <a:r>
+              <a:rPr lang="it-IT" altLang="it-IT" dirty="0"/>
+              <a:t> a </a:t>
+            </a:r>
+            <a:r>
+              <a:rPr lang="it-IT" altLang="it-IT" dirty="0" err="1"/>
+              <a:t>binary</a:t>
+            </a:r>
+            <a:r>
+              <a:rPr lang="it-IT" altLang="it-IT" dirty="0"/>
+              <a:t> </a:t>
+            </a:r>
+            <a:r>
+              <a:rPr lang="it-IT" altLang="it-IT" dirty="0" err="1"/>
+              <a:t>string</a:t>
+            </a:r>
+            <a:r>
+              <a:rPr lang="it-IT" altLang="it-IT" dirty="0"/>
+              <a:t> and </a:t>
+            </a:r>
+            <a:r>
+              <a:rPr lang="it-IT" altLang="it-IT" dirty="0" err="1"/>
+              <a:t>keeps</a:t>
+            </a:r>
+            <a:r>
+              <a:rPr lang="it-IT" altLang="it-IT" dirty="0"/>
+              <a:t> track of </a:t>
+            </a:r>
+            <a:r>
+              <a:rPr lang="it-IT" altLang="it-IT" dirty="0" err="1"/>
+              <a:t>whether</a:t>
+            </a:r>
+            <a:r>
+              <a:rPr lang="it-IT" altLang="it-IT" dirty="0"/>
+              <a:t> the number of '1's is </a:t>
+            </a:r>
+            <a:r>
+              <a:rPr lang="it-IT" altLang="it-IT" dirty="0" err="1"/>
+              <a:t>even</a:t>
+            </a:r>
+            <a:r>
+              <a:rPr lang="it-IT" altLang="it-IT" dirty="0"/>
+              <a:t> or </a:t>
+            </a:r>
+            <a:r>
+              <a:rPr lang="it-IT" altLang="it-IT" dirty="0" err="1"/>
+              <a:t>odd</a:t>
+            </a:r>
+            <a:r>
+              <a:rPr lang="it-IT" altLang="it-IT" dirty="0"/>
+              <a:t>. It </a:t>
+            </a:r>
+            <a:r>
+              <a:rPr lang="it-IT" altLang="it-IT" dirty="0" err="1"/>
+              <a:t>accepts</a:t>
+            </a:r>
+            <a:r>
+              <a:rPr lang="it-IT" altLang="it-IT" dirty="0"/>
+              <a:t> the </a:t>
+            </a:r>
+            <a:r>
+              <a:rPr lang="it-IT" altLang="it-IT" dirty="0" err="1"/>
+              <a:t>string</a:t>
+            </a:r>
+            <a:r>
+              <a:rPr lang="it-IT" altLang="it-IT" dirty="0"/>
+              <a:t> if the </a:t>
+            </a:r>
+            <a:r>
+              <a:rPr lang="it-IT" altLang="it-IT" dirty="0" err="1"/>
+              <a:t>final</a:t>
+            </a:r>
+            <a:r>
+              <a:rPr lang="it-IT" altLang="it-IT" dirty="0"/>
+              <a:t> </a:t>
+            </a:r>
+            <a:r>
+              <a:rPr lang="it-IT" altLang="it-IT" dirty="0" err="1"/>
+              <a:t>count</a:t>
+            </a:r>
+            <a:r>
+              <a:rPr lang="it-IT" altLang="it-IT" dirty="0"/>
+              <a:t> of '1's is </a:t>
+            </a:r>
+            <a:r>
+              <a:rPr lang="it-IT" altLang="it-IT" dirty="0" err="1"/>
+              <a:t>odd</a:t>
+            </a:r>
+            <a:r>
+              <a:rPr lang="it-IT" altLang="it-IT" dirty="0"/>
+              <a:t>, </a:t>
+            </a:r>
+            <a:r>
+              <a:rPr lang="it-IT" altLang="it-IT" dirty="0" err="1"/>
+              <a:t>ending</a:t>
+            </a:r>
+            <a:r>
+              <a:rPr lang="it-IT" altLang="it-IT" dirty="0"/>
+              <a:t> in the "ODD" state. </a:t>
+            </a:r>
+          </a:p>
+        </p:txBody>
+      </p:sp>
     </p:spTree>
     <p:extLst>
       <p:ext uri="{BB962C8B-B14F-4D97-AF65-F5344CB8AC3E}">
@@ -40366,7 +40556,7 @@
         </p:nvSpPr>
         <p:spPr>
           <a:xfrm>
-            <a:off x="577759" y="516732"/>
+            <a:off x="577759" y="526564"/>
             <a:ext cx="10342941" cy="1397597"/>
           </a:xfrm>
         </p:spPr>
@@ -40486,7 +40676,7 @@
         </p:blipFill>
         <p:spPr>
           <a:xfrm>
-            <a:off x="-6215" y="1589329"/>
+            <a:off x="-6215" y="1599161"/>
             <a:ext cx="6112081" cy="5303734"/>
           </a:xfrm>
           <a:custGeom>
@@ -42619,8 +42809,8 @@
         </p:nvSpPr>
         <p:spPr>
           <a:xfrm>
-            <a:off x="6092891" y="725951"/>
-            <a:ext cx="4916971" cy="1442463"/>
+            <a:off x="5302026" y="725951"/>
+            <a:ext cx="6498701" cy="1442463"/>
           </a:xfrm>
         </p:spPr>
         <p:txBody>
@@ -42630,248 +42820,9 @@
           <a:lstStyle/>
           <a:p>
             <a:r>
-              <a:rPr lang="it-IT" b="1"/>
-              <a:t>JSON SPECIFICATIONS </a:t>
+              <a:rPr lang="it-IT" b="1" dirty="0"/>
+              <a:t>JSON SPECIFICATIONS – EVEN NUMBERS</a:t>
             </a:r>
-          </a:p>
-        </p:txBody>
-      </p:sp>
-      <p:sp>
-        <p:nvSpPr>
-          <p:cNvPr id="4" name="Rectangle 1">
-            <a:extLst>
-              <a:ext uri="{FF2B5EF4-FFF2-40B4-BE49-F238E27FC236}">
-                <a16:creationId xmlns:a16="http://schemas.microsoft.com/office/drawing/2014/main" id="{30DF8FD1-D6FB-C12B-775B-FC345A5D55DF}"/>
-              </a:ext>
-            </a:extLst>
-          </p:cNvPr>
-          <p:cNvSpPr>
-            <a:spLocks noGrp="1" noChangeArrowheads="1"/>
-          </p:cNvSpPr>
-          <p:nvPr>
-            <p:ph idx="1"/>
-          </p:nvPr>
-        </p:nvSpPr>
-        <p:spPr bwMode="auto">
-          <a:xfrm>
-            <a:off x="6092891" y="2340130"/>
-            <a:ext cx="4916971" cy="3803271"/>
-          </a:xfrm>
-          <a:prstGeom prst="rect">
-            <a:avLst/>
-          </a:prstGeom>
-          <a:extLst>
-            <a:ext uri="{909E8E84-426E-40DD-AFC4-6F175D3DCCD1}">
-              <a14:hiddenFill xmlns:a14="http://schemas.microsoft.com/office/drawing/2010/main">
-                <a:solidFill>
-                  <a:schemeClr val="accent1"/>
-                </a:solidFill>
-              </a14:hiddenFill>
-            </a:ext>
-            <a:ext uri="{91240B29-F687-4F45-9708-019B960494DF}">
-              <a14:hiddenLine xmlns:a14="http://schemas.microsoft.com/office/drawing/2010/main" w="9525">
-                <a:solidFill>
-                  <a:schemeClr val="tx1"/>
-                </a:solidFill>
-                <a:miter lim="800000"/>
-                <a:headEnd/>
-                <a:tailEnd/>
-              </a14:hiddenLine>
-            </a:ext>
-            <a:ext uri="{AF507438-7753-43E0-B8FC-AC1667EBCBE1}">
-              <a14:hiddenEffects xmlns:a14="http://schemas.microsoft.com/office/drawing/2010/main">
-                <a:effectLst>
-                  <a:outerShdw dist="35921" dir="2700000" algn="ctr" rotWithShape="0">
-                    <a:schemeClr val="bg2"/>
-                  </a:outerShdw>
-                </a:effectLst>
-              </a14:hiddenEffects>
-            </a:ext>
-          </a:extLst>
-        </p:spPr>
-        <p:txBody>
-          <a:bodyPr vert="horz" lIns="91440" tIns="45720" rIns="91440" bIns="45720" numCol="1" anchorCtr="0" compatLnSpc="1">
-            <a:prstTxWarp prst="textNoShape">
-              <a:avLst/>
-            </a:prstTxWarp>
-            <a:normAutofit/>
-          </a:bodyPr>
-          <a:lstStyle/>
-          <a:p>
-            <a:pPr marL="0" marR="0" lvl="0" indent="0" defTabSz="914400" rtl="0" eaLnBrk="0" fontAlgn="base" latinLnBrk="0" hangingPunct="0">
-              <a:spcBef>
-                <a:spcPct val="0"/>
-              </a:spcBef>
-              <a:spcAft>
-                <a:spcPts val="600"/>
-              </a:spcAft>
-              <a:buClrTx/>
-              <a:buSzTx/>
-              <a:buFontTx/>
-              <a:buNone/>
-              <a:tabLst/>
-            </a:pPr>
-            <a:r>
-              <a:rPr lang="it-IT" altLang="it-IT" dirty="0" err="1"/>
-              <a:t>Starting</a:t>
-            </a:r>
-            <a:r>
-              <a:rPr lang="it-IT" altLang="it-IT" dirty="0"/>
-              <a:t> from "START", </a:t>
-            </a:r>
-            <a:r>
-              <a:rPr lang="it-IT" altLang="it-IT" dirty="0" err="1"/>
-              <a:t>this</a:t>
-            </a:r>
-            <a:r>
-              <a:rPr lang="it-IT" altLang="it-IT" dirty="0"/>
-              <a:t> FSM </a:t>
-            </a:r>
-            <a:r>
-              <a:rPr lang="it-IT" altLang="it-IT" dirty="0" err="1"/>
-              <a:t>reads</a:t>
-            </a:r>
-            <a:r>
-              <a:rPr lang="it-IT" altLang="it-IT" dirty="0"/>
-              <a:t> a </a:t>
-            </a:r>
-            <a:r>
-              <a:rPr lang="it-IT" altLang="it-IT" dirty="0" err="1"/>
-              <a:t>binary</a:t>
-            </a:r>
-            <a:r>
-              <a:rPr lang="it-IT" altLang="it-IT" dirty="0"/>
-              <a:t> </a:t>
-            </a:r>
-            <a:r>
-              <a:rPr lang="it-IT" altLang="it-IT" dirty="0" err="1"/>
-              <a:t>string</a:t>
-            </a:r>
-            <a:r>
-              <a:rPr lang="it-IT" altLang="it-IT" dirty="0"/>
-              <a:t> and </a:t>
-            </a:r>
-            <a:r>
-              <a:rPr lang="it-IT" altLang="it-IT" dirty="0" err="1"/>
-              <a:t>keeps</a:t>
-            </a:r>
-            <a:r>
-              <a:rPr lang="it-IT" altLang="it-IT" dirty="0"/>
-              <a:t> track of </a:t>
-            </a:r>
-            <a:r>
-              <a:rPr lang="it-IT" altLang="it-IT" dirty="0" err="1"/>
-              <a:t>whether</a:t>
-            </a:r>
-            <a:r>
-              <a:rPr lang="it-IT" altLang="it-IT" dirty="0"/>
-              <a:t> the </a:t>
-            </a:r>
-            <a:r>
-              <a:rPr lang="it-IT" altLang="it-IT" dirty="0" err="1"/>
-              <a:t>number</a:t>
-            </a:r>
-            <a:r>
-              <a:rPr lang="it-IT" altLang="it-IT" dirty="0"/>
-              <a:t> of '1's </a:t>
-            </a:r>
-            <a:r>
-              <a:rPr lang="it-IT" altLang="it-IT" dirty="0" err="1"/>
-              <a:t>is</a:t>
-            </a:r>
-            <a:r>
-              <a:rPr lang="it-IT" altLang="it-IT" dirty="0"/>
-              <a:t> </a:t>
-            </a:r>
-            <a:r>
-              <a:rPr lang="it-IT" altLang="it-IT" dirty="0" err="1"/>
-              <a:t>even</a:t>
-            </a:r>
-            <a:r>
-              <a:rPr lang="it-IT" altLang="it-IT" dirty="0"/>
-              <a:t> or </a:t>
-            </a:r>
-            <a:r>
-              <a:rPr lang="it-IT" altLang="it-IT" dirty="0" err="1"/>
-              <a:t>odd</a:t>
-            </a:r>
-            <a:r>
-              <a:rPr lang="it-IT" altLang="it-IT" dirty="0"/>
-              <a:t>. </a:t>
-            </a:r>
-            <a:r>
-              <a:rPr lang="it-IT" altLang="it-IT" dirty="0" err="1"/>
-              <a:t>It</a:t>
-            </a:r>
-            <a:r>
-              <a:rPr lang="it-IT" altLang="it-IT" dirty="0"/>
-              <a:t> </a:t>
-            </a:r>
-            <a:r>
-              <a:rPr lang="it-IT" altLang="it-IT" dirty="0" err="1"/>
-              <a:t>accepts</a:t>
-            </a:r>
-            <a:r>
-              <a:rPr lang="it-IT" altLang="it-IT" dirty="0"/>
-              <a:t> the </a:t>
-            </a:r>
-            <a:r>
-              <a:rPr lang="it-IT" altLang="it-IT" dirty="0" err="1"/>
-              <a:t>string</a:t>
-            </a:r>
-            <a:r>
-              <a:rPr lang="it-IT" altLang="it-IT" dirty="0"/>
-              <a:t> </a:t>
-            </a:r>
-            <a:r>
-              <a:rPr lang="it-IT" altLang="it-IT" dirty="0" err="1"/>
-              <a:t>if</a:t>
-            </a:r>
-            <a:r>
-              <a:rPr lang="it-IT" altLang="it-IT" dirty="0"/>
-              <a:t> the </a:t>
-            </a:r>
-            <a:r>
-              <a:rPr lang="it-IT" altLang="it-IT" dirty="0" err="1"/>
-              <a:t>final</a:t>
-            </a:r>
-            <a:r>
-              <a:rPr lang="it-IT" altLang="it-IT" dirty="0"/>
-              <a:t> </a:t>
-            </a:r>
-            <a:r>
-              <a:rPr lang="it-IT" altLang="it-IT" dirty="0" err="1"/>
-              <a:t>count</a:t>
-            </a:r>
-            <a:r>
-              <a:rPr lang="it-IT" altLang="it-IT" dirty="0"/>
-              <a:t> of '1's </a:t>
-            </a:r>
-            <a:r>
-              <a:rPr lang="it-IT" altLang="it-IT" dirty="0" err="1"/>
-              <a:t>is</a:t>
-            </a:r>
-            <a:r>
-              <a:rPr lang="it-IT" altLang="it-IT" dirty="0"/>
-              <a:t> </a:t>
-            </a:r>
-            <a:r>
-              <a:rPr lang="it-IT" altLang="it-IT" dirty="0" err="1"/>
-              <a:t>odd</a:t>
-            </a:r>
-            <a:r>
-              <a:rPr lang="it-IT" altLang="it-IT" dirty="0"/>
-              <a:t>, </a:t>
-            </a:r>
-            <a:r>
-              <a:rPr lang="it-IT" altLang="it-IT" dirty="0" err="1"/>
-              <a:t>ending</a:t>
-            </a:r>
-            <a:r>
-              <a:rPr lang="it-IT" altLang="it-IT" dirty="0"/>
-              <a:t> in the "ODD" state. </a:t>
-            </a:r>
-            <a:endParaRPr lang="it-IT" altLang="it-IT"/>
           </a:p>
         </p:txBody>
       </p:sp>
@@ -42911,6 +42862,352 @@
           </a:prstGeom>
         </p:spPr>
       </p:pic>
+      <p:sp>
+        <p:nvSpPr>
+          <p:cNvPr id="3" name="Content Placeholder 50">
+            <a:extLst>
+              <a:ext uri="{FF2B5EF4-FFF2-40B4-BE49-F238E27FC236}">
+                <a16:creationId xmlns:a16="http://schemas.microsoft.com/office/drawing/2014/main" id="{CAEE1336-0F51-1664-7656-1336D7CB5B10}"/>
+              </a:ext>
+            </a:extLst>
+          </p:cNvPr>
+          <p:cNvSpPr txBox="1">
+            <a:spLocks/>
+          </p:cNvSpPr>
+          <p:nvPr/>
+        </p:nvSpPr>
+        <p:spPr>
+          <a:xfrm>
+            <a:off x="5900364" y="2233456"/>
+            <a:ext cx="4916971" cy="4343046"/>
+          </a:xfrm>
+          <a:prstGeom prst="rect">
+            <a:avLst/>
+          </a:prstGeom>
+        </p:spPr>
+        <p:txBody>
+          <a:bodyPr vert="horz" lIns="91440" tIns="45720" rIns="91440" bIns="45720" rtlCol="0">
+            <a:normAutofit/>
+          </a:bodyPr>
+          <a:lstStyle>
+            <a:lvl1pPr marL="228600" indent="-228600" algn="l" defTabSz="914400" rtl="0" eaLnBrk="1" latinLnBrk="0" hangingPunct="1">
+              <a:lnSpc>
+                <a:spcPct val="110000"/>
+              </a:lnSpc>
+              <a:spcBef>
+                <a:spcPts val="1000"/>
+              </a:spcBef>
+              <a:buClr>
+                <a:schemeClr val="tx2">
+                  <a:lumMod val="50000"/>
+                  <a:lumOff val="50000"/>
+                </a:schemeClr>
+              </a:buClr>
+              <a:buSzPct val="75000"/>
+              <a:buFont typeface="Wingdings" panose="05000000000000000000" pitchFamily="2" charset="2"/>
+              <a:buChar char="§"/>
+              <a:defRPr sz="2000" kern="1200">
+                <a:solidFill>
+                  <a:schemeClr val="tx2"/>
+                </a:solidFill>
+                <a:latin typeface="+mn-lt"/>
+                <a:ea typeface="+mn-ea"/>
+                <a:cs typeface="+mn-cs"/>
+              </a:defRPr>
+            </a:lvl1pPr>
+            <a:lvl2pPr marL="457200" indent="-228600" algn="l" defTabSz="914400" rtl="0" eaLnBrk="1" latinLnBrk="0" hangingPunct="1">
+              <a:lnSpc>
+                <a:spcPct val="110000"/>
+              </a:lnSpc>
+              <a:spcBef>
+                <a:spcPts val="500"/>
+              </a:spcBef>
+              <a:buClr>
+                <a:schemeClr val="tx2">
+                  <a:lumMod val="50000"/>
+                  <a:lumOff val="50000"/>
+                </a:schemeClr>
+              </a:buClr>
+              <a:buSzPct val="75000"/>
+              <a:buFont typeface="Wingdings" panose="05000000000000000000" pitchFamily="2" charset="2"/>
+              <a:buChar char="§"/>
+              <a:defRPr sz="1800" kern="1200">
+                <a:solidFill>
+                  <a:schemeClr val="tx2"/>
+                </a:solidFill>
+                <a:latin typeface="+mn-lt"/>
+                <a:ea typeface="+mn-ea"/>
+                <a:cs typeface="+mn-cs"/>
+              </a:defRPr>
+            </a:lvl2pPr>
+            <a:lvl3pPr marL="685800" indent="-228600" algn="l" defTabSz="914400" rtl="0" eaLnBrk="1" latinLnBrk="0" hangingPunct="1">
+              <a:lnSpc>
+                <a:spcPct val="110000"/>
+              </a:lnSpc>
+              <a:spcBef>
+                <a:spcPts val="500"/>
+              </a:spcBef>
+              <a:buClr>
+                <a:schemeClr val="tx2">
+                  <a:lumMod val="50000"/>
+                  <a:lumOff val="50000"/>
+                </a:schemeClr>
+              </a:buClr>
+              <a:buSzPct val="75000"/>
+              <a:buFont typeface="Wingdings" panose="05000000000000000000" pitchFamily="2" charset="2"/>
+              <a:buChar char="§"/>
+              <a:defRPr sz="1600" kern="1200">
+                <a:solidFill>
+                  <a:schemeClr val="tx2"/>
+                </a:solidFill>
+                <a:latin typeface="+mn-lt"/>
+                <a:ea typeface="+mn-ea"/>
+                <a:cs typeface="+mn-cs"/>
+              </a:defRPr>
+            </a:lvl3pPr>
+            <a:lvl4pPr marL="914400" indent="-228600" algn="l" defTabSz="914400" rtl="0" eaLnBrk="1" latinLnBrk="0" hangingPunct="1">
+              <a:lnSpc>
+                <a:spcPct val="110000"/>
+              </a:lnSpc>
+              <a:spcBef>
+                <a:spcPts val="500"/>
+              </a:spcBef>
+              <a:buClr>
+                <a:schemeClr val="tx2">
+                  <a:lumMod val="50000"/>
+                  <a:lumOff val="50000"/>
+                </a:schemeClr>
+              </a:buClr>
+              <a:buSzPct val="75000"/>
+              <a:buFont typeface="Wingdings" panose="05000000000000000000" pitchFamily="2" charset="2"/>
+              <a:buChar char="§"/>
+              <a:defRPr sz="1400" kern="1200">
+                <a:solidFill>
+                  <a:schemeClr val="tx2"/>
+                </a:solidFill>
+                <a:latin typeface="+mn-lt"/>
+                <a:ea typeface="+mn-ea"/>
+                <a:cs typeface="+mn-cs"/>
+              </a:defRPr>
+            </a:lvl4pPr>
+            <a:lvl5pPr marL="1143000" indent="-228600" algn="l" defTabSz="914400" rtl="0" eaLnBrk="1" latinLnBrk="0" hangingPunct="1">
+              <a:lnSpc>
+                <a:spcPct val="110000"/>
+              </a:lnSpc>
+              <a:spcBef>
+                <a:spcPts val="500"/>
+              </a:spcBef>
+              <a:buClr>
+                <a:schemeClr val="tx2">
+                  <a:lumMod val="50000"/>
+                  <a:lumOff val="50000"/>
+                </a:schemeClr>
+              </a:buClr>
+              <a:buSzPct val="75000"/>
+              <a:buFont typeface="Wingdings" panose="05000000000000000000" pitchFamily="2" charset="2"/>
+              <a:buChar char="§"/>
+              <a:defRPr sz="1400" kern="1200">
+                <a:solidFill>
+                  <a:schemeClr val="tx2"/>
+                </a:solidFill>
+                <a:latin typeface="+mn-lt"/>
+                <a:ea typeface="+mn-ea"/>
+                <a:cs typeface="+mn-cs"/>
+              </a:defRPr>
+            </a:lvl5pPr>
+            <a:lvl6pPr marL="2514600" indent="-228600" algn="l" defTabSz="914400" rtl="0" eaLnBrk="1" latinLnBrk="0" hangingPunct="1">
+              <a:lnSpc>
+                <a:spcPct val="90000"/>
+              </a:lnSpc>
+              <a:spcBef>
+                <a:spcPts val="500"/>
+              </a:spcBef>
+              <a:buFont typeface="Arial" panose="020B0604020202020204" pitchFamily="34" charset="0"/>
+              <a:buChar char="•"/>
+              <a:defRPr sz="1800" kern="1200">
+                <a:solidFill>
+                  <a:schemeClr val="tx1"/>
+                </a:solidFill>
+                <a:latin typeface="+mn-lt"/>
+                <a:ea typeface="+mn-ea"/>
+                <a:cs typeface="+mn-cs"/>
+              </a:defRPr>
+            </a:lvl6pPr>
+            <a:lvl7pPr marL="2971800" indent="-228600" algn="l" defTabSz="914400" rtl="0" eaLnBrk="1" latinLnBrk="0" hangingPunct="1">
+              <a:lnSpc>
+                <a:spcPct val="90000"/>
+              </a:lnSpc>
+              <a:spcBef>
+                <a:spcPts val="500"/>
+              </a:spcBef>
+              <a:buFont typeface="Arial" panose="020B0604020202020204" pitchFamily="34" charset="0"/>
+              <a:buChar char="•"/>
+              <a:defRPr sz="1800" kern="1200">
+                <a:solidFill>
+                  <a:schemeClr val="tx1"/>
+                </a:solidFill>
+                <a:latin typeface="+mn-lt"/>
+                <a:ea typeface="+mn-ea"/>
+                <a:cs typeface="+mn-cs"/>
+              </a:defRPr>
+            </a:lvl7pPr>
+            <a:lvl8pPr marL="3429000" indent="-228600" algn="l" defTabSz="914400" rtl="0" eaLnBrk="1" latinLnBrk="0" hangingPunct="1">
+              <a:lnSpc>
+                <a:spcPct val="90000"/>
+              </a:lnSpc>
+              <a:spcBef>
+                <a:spcPts val="500"/>
+              </a:spcBef>
+              <a:buFont typeface="Arial" panose="020B0604020202020204" pitchFamily="34" charset="0"/>
+              <a:buChar char="•"/>
+              <a:defRPr sz="1800" kern="1200">
+                <a:solidFill>
+                  <a:schemeClr val="tx1"/>
+                </a:solidFill>
+                <a:latin typeface="+mn-lt"/>
+                <a:ea typeface="+mn-ea"/>
+                <a:cs typeface="+mn-cs"/>
+              </a:defRPr>
+            </a:lvl8pPr>
+            <a:lvl9pPr marL="3886200" indent="-228600" algn="l" defTabSz="914400" rtl="0" eaLnBrk="1" latinLnBrk="0" hangingPunct="1">
+              <a:lnSpc>
+                <a:spcPct val="90000"/>
+              </a:lnSpc>
+              <a:spcBef>
+                <a:spcPts val="500"/>
+              </a:spcBef>
+              <a:buFont typeface="Arial" panose="020B0604020202020204" pitchFamily="34" charset="0"/>
+              <a:buChar char="•"/>
+              <a:defRPr sz="1800" kern="1200">
+                <a:solidFill>
+                  <a:schemeClr val="tx1"/>
+                </a:solidFill>
+                <a:latin typeface="+mn-lt"/>
+                <a:ea typeface="+mn-ea"/>
+                <a:cs typeface="+mn-cs"/>
+              </a:defRPr>
+            </a:lvl9pPr>
+          </a:lstStyle>
+          <a:p>
+            <a:r>
+              <a:rPr lang="en-US" dirty="0"/>
+              <a:t>JSON is used to clearly describe the components and behaviors of a finite state machine (FSM) in a structured format. </a:t>
+            </a:r>
+          </a:p>
+          <a:p>
+            <a:r>
+              <a:rPr lang="it-IT" altLang="it-IT" dirty="0" err="1"/>
+              <a:t>Starting</a:t>
+            </a:r>
+            <a:r>
+              <a:rPr lang="it-IT" altLang="it-IT" dirty="0"/>
+              <a:t> from "START", this FSM </a:t>
+            </a:r>
+            <a:r>
+              <a:rPr lang="it-IT" altLang="it-IT" dirty="0" err="1"/>
+              <a:t>reads</a:t>
+            </a:r>
+            <a:r>
+              <a:rPr lang="it-IT" altLang="it-IT" dirty="0"/>
+              <a:t> a </a:t>
+            </a:r>
+            <a:r>
+              <a:rPr lang="it-IT" altLang="it-IT" dirty="0" err="1"/>
+              <a:t>binary</a:t>
+            </a:r>
+            <a:r>
+              <a:rPr lang="it-IT" altLang="it-IT" dirty="0"/>
+              <a:t> </a:t>
+            </a:r>
+            <a:r>
+              <a:rPr lang="it-IT" altLang="it-IT" dirty="0" err="1"/>
+              <a:t>string</a:t>
+            </a:r>
+            <a:r>
+              <a:rPr lang="it-IT" altLang="it-IT" dirty="0"/>
+              <a:t> and tracks </a:t>
+            </a:r>
+            <a:r>
+              <a:rPr lang="it-IT" altLang="it-IT" dirty="0" err="1"/>
+              <a:t>whether</a:t>
+            </a:r>
+            <a:r>
+              <a:rPr lang="it-IT" altLang="it-IT" dirty="0"/>
+              <a:t> the number of '1's is </a:t>
+            </a:r>
+            <a:r>
+              <a:rPr lang="it-IT" altLang="it-IT" dirty="0" err="1"/>
+              <a:t>even</a:t>
+            </a:r>
+            <a:r>
+              <a:rPr lang="it-IT" altLang="it-IT" dirty="0"/>
+              <a:t> or </a:t>
+            </a:r>
+            <a:r>
+              <a:rPr lang="it-IT" altLang="it-IT" dirty="0" err="1"/>
+              <a:t>odd</a:t>
+            </a:r>
+            <a:r>
+              <a:rPr lang="it-IT" altLang="it-IT" dirty="0"/>
+              <a:t>. It </a:t>
+            </a:r>
+            <a:r>
+              <a:rPr lang="it-IT" altLang="it-IT" dirty="0" err="1"/>
+              <a:t>accepts</a:t>
+            </a:r>
+            <a:r>
+              <a:rPr lang="it-IT" altLang="it-IT" dirty="0"/>
+              <a:t> the </a:t>
+            </a:r>
+            <a:r>
+              <a:rPr lang="it-IT" altLang="it-IT" dirty="0" err="1"/>
+              <a:t>string</a:t>
+            </a:r>
+            <a:r>
+              <a:rPr lang="it-IT" altLang="it-IT" dirty="0"/>
+              <a:t> if the </a:t>
+            </a:r>
+            <a:r>
+              <a:rPr lang="it-IT" altLang="it-IT" dirty="0" err="1"/>
+              <a:t>final</a:t>
+            </a:r>
+            <a:r>
+              <a:rPr lang="it-IT" altLang="it-IT" dirty="0"/>
+              <a:t> </a:t>
+            </a:r>
+            <a:r>
+              <a:rPr lang="it-IT" altLang="it-IT" dirty="0" err="1"/>
+              <a:t>count</a:t>
+            </a:r>
+            <a:r>
+              <a:rPr lang="it-IT" altLang="it-IT" dirty="0"/>
+              <a:t> of '1's is </a:t>
+            </a:r>
+            <a:r>
+              <a:rPr lang="it-IT" altLang="it-IT" dirty="0" err="1"/>
+              <a:t>even</a:t>
+            </a:r>
+            <a:r>
+              <a:rPr lang="it-IT" altLang="it-IT" dirty="0"/>
+              <a:t>, </a:t>
+            </a:r>
+            <a:r>
+              <a:rPr lang="it-IT" altLang="it-IT" dirty="0" err="1"/>
+              <a:t>ending</a:t>
+            </a:r>
+            <a:r>
+              <a:rPr lang="it-IT" altLang="it-IT" dirty="0"/>
+              <a:t> in the "EVEN" state. </a:t>
+            </a:r>
+          </a:p>
+          <a:p>
+            <a:endParaRPr lang="en-US" dirty="0"/>
+          </a:p>
+          <a:p>
+            <a:endParaRPr lang="en-US" dirty="0"/>
+          </a:p>
+        </p:txBody>
+      </p:sp>
     </p:spTree>
     <p:extLst>
       <p:ext uri="{BB962C8B-B14F-4D97-AF65-F5344CB8AC3E}">
@@ -47051,7 +47348,7 @@
         </p:blipFill>
         <p:spPr>
           <a:xfrm>
-            <a:off x="1708549" y="725951"/>
+            <a:off x="1708549" y="735783"/>
             <a:ext cx="2261762" cy="5446250"/>
           </a:xfrm>
           <a:prstGeom prst="rect">
@@ -47662,15 +47959,6 @@
 </file>
 
 <file path=customXml/item1.xml><?xml version="1.0" encoding="utf-8"?>
-<?mso-contentType ?>
-<FormTemplates xmlns="http://schemas.microsoft.com/sharepoint/v3/contenttype/forms">
-  <Display>DocumentLibraryForm</Display>
-  <Edit>DocumentLibraryForm</Edit>
-  <New>DocumentLibraryForm</New>
-</FormTemplates>
-</file>
-
-<file path=customXml/item2.xml><?xml version="1.0" encoding="utf-8"?>
 <p:properties xmlns:p="http://schemas.microsoft.com/office/2006/metadata/properties" xmlns:xsi="http://www.w3.org/2001/XMLSchema-instance" xmlns:pc="http://schemas.microsoft.com/office/infopath/2007/PartnerControls">
   <documentManagement>
     <TaxCatchAll xmlns="1d1aad8c-881e-4e5d-aff1-9aba7dbcd899" xsi:nil="true"/>
@@ -47679,6 +47967,15 @@
     </lcf76f155ced4ddcb4097134ff3c332f>
   </documentManagement>
 </p:properties>
+</file>
+
+<file path=customXml/item2.xml><?xml version="1.0" encoding="utf-8"?>
+<?mso-contentType ?>
+<FormTemplates xmlns="http://schemas.microsoft.com/sharepoint/v3/contenttype/forms">
+  <Display>DocumentLibraryForm</Display>
+  <Edit>DocumentLibraryForm</Edit>
+  <New>DocumentLibraryForm</New>
+</FormTemplates>
 </file>
 
 <file path=customXml/item3.xml><?xml version="1.0" encoding="utf-8"?>
@@ -47883,14 +48180,6 @@
 </file>
 
 <file path=customXml/itemProps1.xml><?xml version="1.0" encoding="utf-8"?>
-<ds:datastoreItem xmlns:ds="http://schemas.openxmlformats.org/officeDocument/2006/customXml" ds:itemID="{41B9E640-855C-4CCA-8523-20C35B8162EE}">
-  <ds:schemaRefs>
-    <ds:schemaRef ds:uri="http://schemas.microsoft.com/sharepoint/v3/contenttype/forms"/>
-  </ds:schemaRefs>
-</ds:datastoreItem>
-</file>
-
-<file path=customXml/itemProps2.xml><?xml version="1.0" encoding="utf-8"?>
 <ds:datastoreItem xmlns:ds="http://schemas.openxmlformats.org/officeDocument/2006/customXml" ds:itemID="{B9B2CAEC-6985-4C04-BB95-2588D182A046}">
   <ds:schemaRefs>
     <ds:schemaRef ds:uri="http://purl.org/dc/dcmitype/"/>
@@ -47903,10 +48192,35 @@
     <ds:schemaRef ds:uri="http://schemas.openxmlformats.org/package/2006/metadata/core-properties"/>
     <ds:schemaRef ds:uri="e759017e-6726-40af-81fe-8f81e55f848d"/>
     <ds:schemaRef ds:uri="0f0cd09c-d41b-4b02-9f58-8d4939240ae8"/>
+    <ds:schemaRef ds:uri="1d1aad8c-881e-4e5d-aff1-9aba7dbcd899"/>
+    <ds:schemaRef ds:uri="0b4a4618-71d1-41fc-b0ea-1f051ae64862"/>
+  </ds:schemaRefs>
+</ds:datastoreItem>
+</file>
+
+<file path=customXml/itemProps2.xml><?xml version="1.0" encoding="utf-8"?>
+<ds:datastoreItem xmlns:ds="http://schemas.openxmlformats.org/officeDocument/2006/customXml" ds:itemID="{41B9E640-855C-4CCA-8523-20C35B8162EE}">
+  <ds:schemaRefs>
+    <ds:schemaRef ds:uri="http://schemas.microsoft.com/sharepoint/v3/contenttype/forms"/>
   </ds:schemaRefs>
 </ds:datastoreItem>
 </file>
 
 <file path=customXml/itemProps3.xml><?xml version="1.0" encoding="utf-8"?>
-<ds:datastoreItem xmlns:ds="http://schemas.openxmlformats.org/officeDocument/2006/customXml" ds:itemID="{39BA6AFC-40F5-4561-A9A6-6CA276A98141}"/>
+<ds:datastoreItem xmlns:ds="http://schemas.openxmlformats.org/officeDocument/2006/customXml" ds:itemID="{39BA6AFC-40F5-4561-A9A6-6CA276A98141}">
+  <ds:schemaRefs>
+    <ds:schemaRef ds:uri="http://schemas.microsoft.com/office/2006/metadata/contentType"/>
+    <ds:schemaRef ds:uri="http://schemas.microsoft.com/office/2006/metadata/properties/metaAttributes"/>
+    <ds:schemaRef ds:uri="http://www.w3.org/2001/XMLSchema"/>
+    <ds:schemaRef ds:uri="http://schemas.microsoft.com/office/2006/metadata/properties"/>
+    <ds:schemaRef ds:uri="0b4a4618-71d1-41fc-b0ea-1f051ae64862"/>
+    <ds:schemaRef ds:uri="1d1aad8c-881e-4e5d-aff1-9aba7dbcd899"/>
+    <ds:schemaRef ds:uri="http://schemas.microsoft.com/office/2006/documentManagement/types"/>
+    <ds:schemaRef ds:uri="http://schemas.microsoft.com/office/infopath/2007/PartnerControls"/>
+    <ds:schemaRef ds:uri="http://schemas.openxmlformats.org/package/2006/metadata/core-properties"/>
+    <ds:schemaRef ds:uri="http://purl.org/dc/elements/1.1/"/>
+    <ds:schemaRef ds:uri="http://purl.org/dc/terms/"/>
+    <ds:schemaRef ds:uri="http://schemas.microsoft.com/internal/obd"/>
+  </ds:schemaRefs>
+</ds:datastoreItem>
 </file>
</xml_diff>